<commit_message>
Updated Introduction to HTS material, added etherpad
</commit_message>
<xml_diff>
--- a/Intro_HTS/NGS_intro_HTS_analysis_slides.pptx
+++ b/Intro_HTS/NGS_intro_HTS_analysis_slides.pptx
@@ -5,24 +5,25 @@
     <p:sldMasterId id="2147483648" r:id="rId1"/>
   </p:sldMasterIdLst>
   <p:notesMasterIdLst>
-    <p:notesMasterId r:id="rId17"/>
+    <p:notesMasterId r:id="rId18"/>
   </p:notesMasterIdLst>
   <p:sldIdLst>
     <p:sldId id="256" r:id="rId2"/>
-    <p:sldId id="268" r:id="rId3"/>
-    <p:sldId id="261" r:id="rId4"/>
-    <p:sldId id="271" r:id="rId5"/>
-    <p:sldId id="258" r:id="rId6"/>
-    <p:sldId id="259" r:id="rId7"/>
-    <p:sldId id="260" r:id="rId8"/>
-    <p:sldId id="262" r:id="rId9"/>
-    <p:sldId id="263" r:id="rId10"/>
-    <p:sldId id="264" r:id="rId11"/>
-    <p:sldId id="265" r:id="rId12"/>
-    <p:sldId id="266" r:id="rId13"/>
-    <p:sldId id="267" r:id="rId14"/>
-    <p:sldId id="269" r:id="rId15"/>
-    <p:sldId id="270" r:id="rId16"/>
+    <p:sldId id="272" r:id="rId3"/>
+    <p:sldId id="268" r:id="rId4"/>
+    <p:sldId id="261" r:id="rId5"/>
+    <p:sldId id="271" r:id="rId6"/>
+    <p:sldId id="258" r:id="rId7"/>
+    <p:sldId id="259" r:id="rId8"/>
+    <p:sldId id="260" r:id="rId9"/>
+    <p:sldId id="262" r:id="rId10"/>
+    <p:sldId id="263" r:id="rId11"/>
+    <p:sldId id="264" r:id="rId12"/>
+    <p:sldId id="265" r:id="rId13"/>
+    <p:sldId id="266" r:id="rId14"/>
+    <p:sldId id="267" r:id="rId15"/>
+    <p:sldId id="269" r:id="rId16"/>
+    <p:sldId id="270" r:id="rId17"/>
   </p:sldIdLst>
   <p:sldSz cx="9144000" cy="6858000" type="screen4x3"/>
   <p:notesSz cx="6858000" cy="9144000"/>
@@ -207,7 +208,7 @@
             <a:fld id="{7B017CDE-E91F-D348-A70E-2B7B84391936}" type="datetimeFigureOut">
               <a:rPr lang="en-US" smtClean="0"/>
               <a:pPr/>
-              <a:t>04/10/15</a:t>
+              <a:t>05/10/15</a:t>
             </a:fld>
             <a:endParaRPr lang="en-US"/>
           </a:p>
@@ -660,7 +661,7 @@
             <a:fld id="{A4AAEA4C-2FC0-8F41-AA8D-DA93A16F9072}" type="datetimeFigureOut">
               <a:rPr lang="en-US" smtClean="0"/>
               <a:pPr/>
-              <a:t>04/10/15</a:t>
+              <a:t>05/10/15</a:t>
             </a:fld>
             <a:endParaRPr lang="en-US"/>
           </a:p>
@@ -827,7 +828,7 @@
             <a:fld id="{A4AAEA4C-2FC0-8F41-AA8D-DA93A16F9072}" type="datetimeFigureOut">
               <a:rPr lang="en-US" smtClean="0"/>
               <a:pPr/>
-              <a:t>04/10/15</a:t>
+              <a:t>05/10/15</a:t>
             </a:fld>
             <a:endParaRPr lang="en-US"/>
           </a:p>
@@ -1004,7 +1005,7 @@
             <a:fld id="{A4AAEA4C-2FC0-8F41-AA8D-DA93A16F9072}" type="datetimeFigureOut">
               <a:rPr lang="en-US" smtClean="0"/>
               <a:pPr/>
-              <a:t>04/10/15</a:t>
+              <a:t>05/10/15</a:t>
             </a:fld>
             <a:endParaRPr lang="en-US"/>
           </a:p>
@@ -1171,7 +1172,7 @@
             <a:fld id="{A4AAEA4C-2FC0-8F41-AA8D-DA93A16F9072}" type="datetimeFigureOut">
               <a:rPr lang="en-US" smtClean="0"/>
               <a:pPr/>
-              <a:t>04/10/15</a:t>
+              <a:t>05/10/15</a:t>
             </a:fld>
             <a:endParaRPr lang="en-US"/>
           </a:p>
@@ -1414,7 +1415,7 @@
             <a:fld id="{A4AAEA4C-2FC0-8F41-AA8D-DA93A16F9072}" type="datetimeFigureOut">
               <a:rPr lang="en-US" smtClean="0"/>
               <a:pPr/>
-              <a:t>04/10/15</a:t>
+              <a:t>05/10/15</a:t>
             </a:fld>
             <a:endParaRPr lang="en-US"/>
           </a:p>
@@ -1699,7 +1700,7 @@
             <a:fld id="{A4AAEA4C-2FC0-8F41-AA8D-DA93A16F9072}" type="datetimeFigureOut">
               <a:rPr lang="en-US" smtClean="0"/>
               <a:pPr/>
-              <a:t>04/10/15</a:t>
+              <a:t>05/10/15</a:t>
             </a:fld>
             <a:endParaRPr lang="en-US"/>
           </a:p>
@@ -2118,7 +2119,7 @@
             <a:fld id="{A4AAEA4C-2FC0-8F41-AA8D-DA93A16F9072}" type="datetimeFigureOut">
               <a:rPr lang="en-US" smtClean="0"/>
               <a:pPr/>
-              <a:t>04/10/15</a:t>
+              <a:t>05/10/15</a:t>
             </a:fld>
             <a:endParaRPr lang="en-US"/>
           </a:p>
@@ -2233,7 +2234,7 @@
             <a:fld id="{A4AAEA4C-2FC0-8F41-AA8D-DA93A16F9072}" type="datetimeFigureOut">
               <a:rPr lang="en-US" smtClean="0"/>
               <a:pPr/>
-              <a:t>04/10/15</a:t>
+              <a:t>05/10/15</a:t>
             </a:fld>
             <a:endParaRPr lang="en-US"/>
           </a:p>
@@ -2325,7 +2326,7 @@
             <a:fld id="{A4AAEA4C-2FC0-8F41-AA8D-DA93A16F9072}" type="datetimeFigureOut">
               <a:rPr lang="en-US" smtClean="0"/>
               <a:pPr/>
-              <a:t>04/10/15</a:t>
+              <a:t>05/10/15</a:t>
             </a:fld>
             <a:endParaRPr lang="en-US"/>
           </a:p>
@@ -2599,7 +2600,7 @@
             <a:fld id="{A4AAEA4C-2FC0-8F41-AA8D-DA93A16F9072}" type="datetimeFigureOut">
               <a:rPr lang="en-US" smtClean="0"/>
               <a:pPr/>
-              <a:t>04/10/15</a:t>
+              <a:t>05/10/15</a:t>
             </a:fld>
             <a:endParaRPr lang="en-US"/>
           </a:p>
@@ -2849,7 +2850,7 @@
             <a:fld id="{A4AAEA4C-2FC0-8F41-AA8D-DA93A16F9072}" type="datetimeFigureOut">
               <a:rPr lang="en-US" smtClean="0"/>
               <a:pPr/>
-              <a:t>04/10/15</a:t>
+              <a:t>05/10/15</a:t>
             </a:fld>
             <a:endParaRPr lang="en-US"/>
           </a:p>
@@ -3119,7 +3120,7 @@
             <a:fld id="{A4AAEA4C-2FC0-8F41-AA8D-DA93A16F9072}" type="datetimeFigureOut">
               <a:rPr lang="en-US" smtClean="0"/>
               <a:pPr/>
-              <a:t>04/10/15</a:t>
+              <a:t>05/10/15</a:t>
             </a:fld>
             <a:endParaRPr lang="en-US"/>
           </a:p>
@@ -3675,18 +3676,12 @@
         </p:nvSpPr>
         <p:spPr/>
         <p:txBody>
-          <a:bodyPr>
-            <a:normAutofit/>
-          </a:bodyPr>
-          <a:lstStyle/>
-          <a:p>
-            <a:r>
-              <a:rPr lang="en-US" dirty="0"/>
-              <a:t>Compute </a:t>
-            </a:r>
+          <a:bodyPr/>
+          <a:lstStyle/>
+          <a:p>
             <a:r>
               <a:rPr lang="en-US" dirty="0" smtClean="0"/>
-              <a:t>resources</a:t>
+              <a:t>Software</a:t>
             </a:r>
             <a:endParaRPr lang="en-US" dirty="0"/>
           </a:p>
@@ -3694,7 +3689,7 @@
       </p:sp>
       <p:sp>
         <p:nvSpPr>
-          <p:cNvPr id="4" name="Content Placeholder 3"/>
+          <p:cNvPr id="2" name="Content Placeholder 1"/>
           <p:cNvSpPr>
             <a:spLocks noGrp="1"/>
           </p:cNvSpPr>
@@ -3715,15 +3710,15 @@
             </a:pPr>
             <a:r>
               <a:rPr lang="en-US" dirty="0" smtClean="0"/>
-              <a:t>Local </a:t>
+              <a:t>Understanding </a:t>
             </a:r>
             <a:r>
               <a:rPr lang="en-US" dirty="0"/>
-              <a:t>versus HPC versus </a:t>
+              <a:t>the </a:t>
             </a:r>
             <a:r>
               <a:rPr lang="en-US" dirty="0" smtClean="0"/>
-              <a:t>cloud</a:t>
+              <a:t>algorithms</a:t>
             </a:r>
           </a:p>
           <a:p>
@@ -3733,7 +3728,7 @@
             </a:pPr>
             <a:r>
               <a:rPr lang="en-US" dirty="0" smtClean="0"/>
-              <a:t>Computational time</a:t>
+              <a:t>Installing software</a:t>
             </a:r>
           </a:p>
           <a:p>
@@ -3743,7 +3738,15 @@
             </a:pPr>
             <a:r>
               <a:rPr lang="en-US" dirty="0" smtClean="0"/>
-              <a:t>Getting access</a:t>
+              <a:t>Choosing </a:t>
+            </a:r>
+            <a:r>
+              <a:rPr lang="en-US" dirty="0"/>
+              <a:t>program from all </a:t>
+            </a:r>
+            <a:r>
+              <a:rPr lang="en-US" dirty="0" smtClean="0"/>
+              <a:t>possible</a:t>
             </a:r>
           </a:p>
           <a:p>
@@ -3753,11 +3756,65 @@
             </a:pPr>
             <a:r>
               <a:rPr lang="en-US" dirty="0" smtClean="0"/>
-              <a:t>Optimal </a:t>
+              <a:t>Can </a:t>
             </a:r>
             <a:r>
               <a:rPr lang="en-US" dirty="0"/>
-              <a:t>use of HPC resources</a:t>
+              <a:t>not always use the same </a:t>
+            </a:r>
+            <a:r>
+              <a:rPr lang="en-US" dirty="0" smtClean="0"/>
+              <a:t>tool</a:t>
+            </a:r>
+          </a:p>
+          <a:p>
+            <a:pPr marL="457200" indent="-457200">
+              <a:buFont typeface="Arial"/>
+              <a:buChar char="•"/>
+            </a:pPr>
+            <a:r>
+              <a:rPr lang="en-US" dirty="0" smtClean="0"/>
+              <a:t>Not </a:t>
+            </a:r>
+            <a:r>
+              <a:rPr lang="en-US" dirty="0"/>
+              <a:t>always the same tool that is </a:t>
+            </a:r>
+            <a:r>
+              <a:rPr lang="en-US" dirty="0" smtClean="0"/>
+              <a:t>best</a:t>
+            </a:r>
+          </a:p>
+          <a:p>
+            <a:pPr marL="457200" indent="-457200">
+              <a:buFont typeface="Arial"/>
+              <a:buChar char="•"/>
+            </a:pPr>
+            <a:r>
+              <a:rPr lang="en-US" dirty="0" smtClean="0"/>
+              <a:t>Software </a:t>
+            </a:r>
+            <a:r>
+              <a:rPr lang="en-US" dirty="0"/>
+              <a:t>parameter </a:t>
+            </a:r>
+            <a:r>
+              <a:rPr lang="en-US" dirty="0" smtClean="0"/>
+              <a:t>space</a:t>
+            </a:r>
+          </a:p>
+          <a:p>
+            <a:pPr marL="457200" indent="-457200">
+              <a:buFont typeface="Arial"/>
+              <a:buChar char="•"/>
+            </a:pPr>
+            <a:r>
+              <a:rPr lang="en-US" dirty="0" smtClean="0"/>
+              <a:t>Validation of </a:t>
+            </a:r>
+            <a:r>
+              <a:rPr lang="en-US" dirty="0"/>
+              <a:t>computational results</a:t>
             </a:r>
           </a:p>
           <a:p>
@@ -3771,13 +3828,20 @@
     </p:spTree>
     <p:extLst>
       <p:ext uri="{BB962C8B-B14F-4D97-AF65-F5344CB8AC3E}">
-        <p14:creationId xmlns:p14="http://schemas.microsoft.com/office/powerpoint/2010/main" val="994112433"/>
+        <p14:creationId xmlns:p14="http://schemas.microsoft.com/office/powerpoint/2010/main" val="4113967667"/>
       </p:ext>
     </p:extLst>
   </p:cSld>
   <p:clrMapOvr>
     <a:masterClrMapping/>
   </p:clrMapOvr>
+  <p:timing>
+    <p:tnLst>
+      <p:par>
+        <p:cTn xmlns:p14="http://schemas.microsoft.com/office/powerpoint/2010/main" id="1" dur="indefinite" restart="never" nodeType="tmRoot"/>
+      </p:par>
+    </p:tnLst>
+  </p:timing>
 </p:sld>
 </file>
 
@@ -3817,11 +3881,11 @@
           <a:p>
             <a:r>
               <a:rPr lang="en-US" dirty="0"/>
-              <a:t>User </a:t>
+              <a:t>Compute </a:t>
             </a:r>
             <a:r>
               <a:rPr lang="en-US" dirty="0" smtClean="0"/>
-              <a:t>interfaces</a:t>
+              <a:t>resources</a:t>
             </a:r>
             <a:endParaRPr lang="en-US" dirty="0"/>
           </a:p>
@@ -3839,7 +3903,9 @@
         </p:nvSpPr>
         <p:spPr/>
         <p:txBody>
-          <a:bodyPr/>
+          <a:bodyPr>
+            <a:normAutofit/>
+          </a:bodyPr>
           <a:lstStyle/>
           <a:p>
             <a:pPr marL="457200" indent="-457200">
@@ -3847,12 +3913,16 @@
               <a:buChar char="•"/>
             </a:pPr>
             <a:r>
-              <a:rPr lang="en-US" dirty="0" err="1" smtClean="0"/>
-              <a:t>unix</a:t>
-            </a:r>
-            <a:r>
               <a:rPr lang="en-US" dirty="0" smtClean="0"/>
-              <a:t> shell</a:t>
+              <a:t>Local </a:t>
+            </a:r>
+            <a:r>
+              <a:rPr lang="en-US" dirty="0"/>
+              <a:t>versus HPC versus </a:t>
+            </a:r>
+            <a:r>
+              <a:rPr lang="en-US" dirty="0" smtClean="0"/>
+              <a:t>cloud</a:t>
             </a:r>
           </a:p>
           <a:p>
@@ -3862,15 +3932,7 @@
             </a:pPr>
             <a:r>
               <a:rPr lang="en-US" dirty="0" smtClean="0"/>
-              <a:t>web</a:t>
-            </a:r>
-            <a:r>
-              <a:rPr lang="en-US" dirty="0"/>
-              <a:t>-</a:t>
-            </a:r>
-            <a:r>
-              <a:rPr lang="en-US" dirty="0" smtClean="0"/>
-              <a:t>based</a:t>
+              <a:t>Computational time</a:t>
             </a:r>
           </a:p>
           <a:p>
@@ -3880,11 +3942,21 @@
             </a:pPr>
             <a:r>
               <a:rPr lang="en-US" dirty="0" smtClean="0"/>
-              <a:t>GUI</a:t>
+              <a:t>Getting access</a:t>
+            </a:r>
+          </a:p>
+          <a:p>
+            <a:pPr marL="457200" indent="-457200">
+              <a:buFont typeface="Arial"/>
+              <a:buChar char="•"/>
+            </a:pPr>
+            <a:r>
+              <a:rPr lang="en-US" dirty="0" smtClean="0"/>
+              <a:t>Optimal </a:t>
             </a:r>
             <a:r>
               <a:rPr lang="en-US" dirty="0"/>
-              <a:t>-based</a:t>
+              <a:t>use of HPC resources</a:t>
             </a:r>
           </a:p>
           <a:p>
@@ -3898,13 +3970,20 @@
     </p:spTree>
     <p:extLst>
       <p:ext uri="{BB962C8B-B14F-4D97-AF65-F5344CB8AC3E}">
-        <p14:creationId xmlns:p14="http://schemas.microsoft.com/office/powerpoint/2010/main" val="1195921538"/>
+        <p14:creationId xmlns:p14="http://schemas.microsoft.com/office/powerpoint/2010/main" val="994112433"/>
       </p:ext>
     </p:extLst>
   </p:cSld>
   <p:clrMapOvr>
     <a:masterClrMapping/>
   </p:clrMapOvr>
+  <p:timing>
+    <p:tnLst>
+      <p:par>
+        <p:cTn xmlns:p14="http://schemas.microsoft.com/office/powerpoint/2010/main" id="1" dur="indefinite" restart="never" nodeType="tmRoot"/>
+      </p:par>
+    </p:tnLst>
+  </p:timing>
 </p:sld>
 </file>
 
@@ -3937,12 +4016,18 @@
         </p:nvSpPr>
         <p:spPr/>
         <p:txBody>
-          <a:bodyPr/>
-          <a:lstStyle/>
-          <a:p>
+          <a:bodyPr>
+            <a:normAutofit/>
+          </a:bodyPr>
+          <a:lstStyle/>
+          <a:p>
+            <a:r>
+              <a:rPr lang="en-US" dirty="0"/>
+              <a:t>User </a:t>
+            </a:r>
             <a:r>
               <a:rPr lang="en-US" dirty="0" smtClean="0"/>
-              <a:t>Skills</a:t>
+              <a:t>interfaces</a:t>
             </a:r>
             <a:endParaRPr lang="en-US" dirty="0"/>
           </a:p>
@@ -3968,8 +4053,12 @@
               <a:buChar char="•"/>
             </a:pPr>
             <a:r>
+              <a:rPr lang="en-US" dirty="0" err="1" smtClean="0"/>
+              <a:t>unix</a:t>
+            </a:r>
+            <a:r>
               <a:rPr lang="en-US" dirty="0" smtClean="0"/>
-              <a:t>Unix skills</a:t>
+              <a:t> shell</a:t>
             </a:r>
           </a:p>
           <a:p>
@@ -3979,7 +4068,15 @@
             </a:pPr>
             <a:r>
               <a:rPr lang="en-US" dirty="0" smtClean="0"/>
-              <a:t>Programming skills</a:t>
+              <a:t>web</a:t>
+            </a:r>
+            <a:r>
+              <a:rPr lang="en-US" dirty="0"/>
+              <a:t>-</a:t>
+            </a:r>
+            <a:r>
+              <a:rPr lang="en-US" dirty="0" smtClean="0"/>
+              <a:t>based</a:t>
             </a:r>
           </a:p>
           <a:p>
@@ -3989,9 +4086,12 @@
             </a:pPr>
             <a:r>
               <a:rPr lang="en-US" dirty="0" smtClean="0"/>
-              <a:t>Statistics</a:t>
-            </a:r>
-            <a:endParaRPr lang="en-US" dirty="0"/>
+              <a:t>GUI</a:t>
+            </a:r>
+            <a:r>
+              <a:rPr lang="en-US" dirty="0"/>
+              <a:t>-based</a:t>
+            </a:r>
           </a:p>
           <a:p>
             <a:endParaRPr lang="en-US" dirty="0"/>
@@ -4004,13 +4104,20 @@
     </p:spTree>
     <p:extLst>
       <p:ext uri="{BB962C8B-B14F-4D97-AF65-F5344CB8AC3E}">
-        <p14:creationId xmlns:p14="http://schemas.microsoft.com/office/powerpoint/2010/main" val="1991649111"/>
+        <p14:creationId xmlns:p14="http://schemas.microsoft.com/office/powerpoint/2010/main" val="1195921538"/>
       </p:ext>
     </p:extLst>
   </p:cSld>
   <p:clrMapOvr>
     <a:masterClrMapping/>
   </p:clrMapOvr>
+  <p:timing>
+    <p:tnLst>
+      <p:par>
+        <p:cTn xmlns:p14="http://schemas.microsoft.com/office/powerpoint/2010/main" id="1" dur="indefinite" restart="never" nodeType="tmRoot"/>
+      </p:par>
+    </p:tnLst>
+  </p:timing>
 </p:sld>
 </file>
 
@@ -4047,6 +4154,119 @@
           <a:lstStyle/>
           <a:p>
             <a:r>
+              <a:rPr lang="en-US" dirty="0" smtClean="0"/>
+              <a:t>Skills</a:t>
+            </a:r>
+            <a:endParaRPr lang="en-US" dirty="0"/>
+          </a:p>
+        </p:txBody>
+      </p:sp>
+      <p:sp>
+        <p:nvSpPr>
+          <p:cNvPr id="4" name="Content Placeholder 3"/>
+          <p:cNvSpPr>
+            <a:spLocks noGrp="1"/>
+          </p:cNvSpPr>
+          <p:nvPr>
+            <p:ph idx="1"/>
+          </p:nvPr>
+        </p:nvSpPr>
+        <p:spPr/>
+        <p:txBody>
+          <a:bodyPr/>
+          <a:lstStyle/>
+          <a:p>
+            <a:pPr marL="457200" indent="-457200">
+              <a:buFont typeface="Arial"/>
+              <a:buChar char="•"/>
+            </a:pPr>
+            <a:r>
+              <a:rPr lang="en-US" dirty="0" smtClean="0"/>
+              <a:t>Unix skills</a:t>
+            </a:r>
+          </a:p>
+          <a:p>
+            <a:pPr marL="457200" indent="-457200">
+              <a:buFont typeface="Arial"/>
+              <a:buChar char="•"/>
+            </a:pPr>
+            <a:r>
+              <a:rPr lang="en-US" dirty="0" smtClean="0"/>
+              <a:t>Programming skills</a:t>
+            </a:r>
+          </a:p>
+          <a:p>
+            <a:pPr marL="457200" indent="-457200">
+              <a:buFont typeface="Arial"/>
+              <a:buChar char="•"/>
+            </a:pPr>
+            <a:r>
+              <a:rPr lang="en-US" dirty="0" smtClean="0"/>
+              <a:t>Statistics</a:t>
+            </a:r>
+            <a:endParaRPr lang="en-US" dirty="0"/>
+          </a:p>
+          <a:p>
+            <a:endParaRPr lang="en-US" dirty="0"/>
+          </a:p>
+          <a:p>
+            <a:endParaRPr lang="en-US" dirty="0"/>
+          </a:p>
+        </p:txBody>
+      </p:sp>
+    </p:spTree>
+    <p:extLst>
+      <p:ext uri="{BB962C8B-B14F-4D97-AF65-F5344CB8AC3E}">
+        <p14:creationId xmlns:p14="http://schemas.microsoft.com/office/powerpoint/2010/main" val="1991649111"/>
+      </p:ext>
+    </p:extLst>
+  </p:cSld>
+  <p:clrMapOvr>
+    <a:masterClrMapping/>
+  </p:clrMapOvr>
+  <p:timing>
+    <p:tnLst>
+      <p:par>
+        <p:cTn xmlns:p14="http://schemas.microsoft.com/office/powerpoint/2010/main" id="1" dur="indefinite" restart="never" nodeType="tmRoot"/>
+      </p:par>
+    </p:tnLst>
+  </p:timing>
+</p:sld>
+</file>
+
+<file path=ppt/slides/slide14.xml><?xml version="1.0" encoding="utf-8"?>
+<p:sld xmlns:a="http://schemas.openxmlformats.org/drawingml/2006/main" xmlns:r="http://schemas.openxmlformats.org/officeDocument/2006/relationships" xmlns:p="http://schemas.openxmlformats.org/presentationml/2006/main">
+  <p:cSld>
+    <p:spTree>
+      <p:nvGrpSpPr>
+        <p:cNvPr id="1" name=""/>
+        <p:cNvGrpSpPr/>
+        <p:nvPr/>
+      </p:nvGrpSpPr>
+      <p:grpSpPr>
+        <a:xfrm>
+          <a:off x="0" y="0"/>
+          <a:ext cx="0" cy="0"/>
+          <a:chOff x="0" y="0"/>
+          <a:chExt cx="0" cy="0"/>
+        </a:xfrm>
+      </p:grpSpPr>
+      <p:sp>
+        <p:nvSpPr>
+          <p:cNvPr id="3" name="Title 2"/>
+          <p:cNvSpPr>
+            <a:spLocks noGrp="1"/>
+          </p:cNvSpPr>
+          <p:nvPr>
+            <p:ph type="title"/>
+          </p:nvPr>
+        </p:nvSpPr>
+        <p:spPr/>
+        <p:txBody>
+          <a:bodyPr/>
+          <a:lstStyle/>
+          <a:p>
+            <a:r>
               <a:rPr lang="en-US" dirty="0"/>
               <a:t>Ethics</a:t>
             </a:r>
@@ -4116,10 +4336,17 @@
   <p:clrMapOvr>
     <a:masterClrMapping/>
   </p:clrMapOvr>
+  <p:timing>
+    <p:tnLst>
+      <p:par>
+        <p:cTn xmlns:p14="http://schemas.microsoft.com/office/powerpoint/2010/main" id="1" dur="indefinite" restart="never" nodeType="tmRoot"/>
+      </p:par>
+    </p:tnLst>
+  </p:timing>
 </p:sld>
 </file>
 
-<file path=ppt/slides/slide14.xml><?xml version="1.0" encoding="utf-8"?>
+<file path=ppt/slides/slide15.xml><?xml version="1.0" encoding="utf-8"?>
 <p:sld xmlns:a="http://schemas.openxmlformats.org/drawingml/2006/main" xmlns:r="http://schemas.openxmlformats.org/officeDocument/2006/relationships" xmlns:p="http://schemas.openxmlformats.org/presentationml/2006/main">
   <p:cSld>
     <p:spTree>
@@ -4263,10 +4490,17 @@
   <p:clrMapOvr>
     <a:masterClrMapping/>
   </p:clrMapOvr>
+  <p:timing>
+    <p:tnLst>
+      <p:par>
+        <p:cTn xmlns:p14="http://schemas.microsoft.com/office/powerpoint/2010/main" id="1" dur="indefinite" restart="never" nodeType="tmRoot"/>
+      </p:par>
+    </p:tnLst>
+  </p:timing>
 </p:sld>
 </file>
 
-<file path=ppt/slides/slide15.xml><?xml version="1.0" encoding="utf-8"?>
+<file path=ppt/slides/slide16.xml><?xml version="1.0" encoding="utf-8"?>
 <p:sld xmlns:a="http://schemas.openxmlformats.org/drawingml/2006/main" xmlns:r="http://schemas.openxmlformats.org/officeDocument/2006/relationships" xmlns:p="http://schemas.openxmlformats.org/presentationml/2006/main">
   <p:cSld>
     <p:spTree>
@@ -4443,6 +4677,309 @@
       </p:grpSpPr>
       <p:sp>
         <p:nvSpPr>
+          <p:cNvPr id="3" name="Content Placeholder 2"/>
+          <p:cNvSpPr>
+            <a:spLocks noGrp="1"/>
+          </p:cNvSpPr>
+          <p:nvPr>
+            <p:ph idx="1"/>
+          </p:nvPr>
+        </p:nvSpPr>
+        <p:spPr>
+          <a:xfrm>
+            <a:off x="457200" y="403115"/>
+            <a:ext cx="8229600" cy="6107197"/>
+          </a:xfrm>
+        </p:spPr>
+        <p:txBody>
+          <a:bodyPr>
+            <a:normAutofit fontScale="62500" lnSpcReduction="20000"/>
+          </a:bodyPr>
+          <a:lstStyle/>
+          <a:p>
+            <a:r>
+              <a:rPr lang="en-US" dirty="0" err="1"/>
+              <a:t>Illumina</a:t>
+            </a:r>
+            <a:r>
+              <a:rPr lang="en-US" dirty="0"/>
+              <a:t> </a:t>
+            </a:r>
+            <a:r>
+              <a:rPr lang="en-US" dirty="0" err="1"/>
+              <a:t>HiSeq</a:t>
+            </a:r>
+            <a:r>
+              <a:rPr lang="en-US" dirty="0"/>
+              <a:t> 1000 1500 2000 2500 3000 </a:t>
+            </a:r>
+            <a:r>
+              <a:rPr lang="en-US" dirty="0" smtClean="0"/>
+              <a:t>4000</a:t>
+            </a:r>
+          </a:p>
+          <a:p>
+            <a:r>
+              <a:rPr lang="en-US" dirty="0" err="1" smtClean="0"/>
+              <a:t>Illumina</a:t>
+            </a:r>
+            <a:r>
+              <a:rPr lang="en-US" dirty="0" smtClean="0"/>
+              <a:t> </a:t>
+            </a:r>
+            <a:r>
+              <a:rPr lang="en-US" dirty="0" err="1"/>
+              <a:t>HiSeq</a:t>
+            </a:r>
+            <a:r>
+              <a:rPr lang="en-US" dirty="0"/>
+              <a:t> X (Five and Ten)</a:t>
+            </a:r>
+          </a:p>
+          <a:p>
+            <a:r>
+              <a:rPr lang="en-US" dirty="0" err="1"/>
+              <a:t>Illumina</a:t>
+            </a:r>
+            <a:r>
+              <a:rPr lang="en-US" dirty="0"/>
+              <a:t> </a:t>
+            </a:r>
+            <a:r>
+              <a:rPr lang="en-US" dirty="0" err="1"/>
+              <a:t>NextSeq</a:t>
+            </a:r>
+            <a:r>
+              <a:rPr lang="en-US" dirty="0"/>
+              <a:t> 500</a:t>
+            </a:r>
+          </a:p>
+          <a:p>
+            <a:r>
+              <a:rPr lang="en-US" dirty="0" err="1"/>
+              <a:t>Illumina</a:t>
+            </a:r>
+            <a:r>
+              <a:rPr lang="en-US" dirty="0"/>
+              <a:t> </a:t>
+            </a:r>
+            <a:r>
+              <a:rPr lang="en-US" dirty="0" err="1"/>
+              <a:t>MiSeq</a:t>
+            </a:r>
+            <a:endParaRPr lang="en-US" dirty="0"/>
+          </a:p>
+          <a:p>
+            <a:r>
+              <a:rPr lang="en-US" dirty="0"/>
+              <a:t>Pacific Biosciences RSII</a:t>
+            </a:r>
+          </a:p>
+          <a:p>
+            <a:r>
+              <a:rPr lang="en-US" dirty="0"/>
+              <a:t>Ion Torrent PGM</a:t>
+            </a:r>
+          </a:p>
+          <a:p>
+            <a:r>
+              <a:rPr lang="en-US" dirty="0"/>
+              <a:t>Ion Torrent Proton</a:t>
+            </a:r>
+          </a:p>
+          <a:p>
+            <a:r>
+              <a:rPr lang="en-US" dirty="0"/>
+              <a:t>Ion Torrent S5 and S5XL</a:t>
+            </a:r>
+          </a:p>
+          <a:p>
+            <a:r>
+              <a:rPr lang="en-US" dirty="0"/>
+              <a:t>Oxford </a:t>
+            </a:r>
+            <a:r>
+              <a:rPr lang="en-US" dirty="0" err="1"/>
+              <a:t>Nanopore</a:t>
+            </a:r>
+            <a:r>
+              <a:rPr lang="en-US" dirty="0"/>
+              <a:t> </a:t>
+            </a:r>
+            <a:r>
+              <a:rPr lang="en-US" dirty="0" err="1"/>
+              <a:t>MinION</a:t>
+            </a:r>
+            <a:r>
+              <a:rPr lang="en-US" dirty="0"/>
+              <a:t> (</a:t>
+            </a:r>
+            <a:r>
+              <a:rPr lang="en-US" dirty="0" err="1"/>
+              <a:t>MkI</a:t>
+            </a:r>
+            <a:r>
+              <a:rPr lang="en-US" dirty="0"/>
+              <a:t>), </a:t>
+            </a:r>
+            <a:r>
+              <a:rPr lang="en-US" dirty="0" err="1"/>
+              <a:t>PromethION</a:t>
+            </a:r>
+            <a:r>
+              <a:rPr lang="en-US" dirty="0"/>
+              <a:t>, </a:t>
+            </a:r>
+            <a:r>
+              <a:rPr lang="en-US" dirty="0" err="1" smtClean="0"/>
+              <a:t>GridIO</a:t>
+            </a:r>
+            <a:endParaRPr lang="en-US" dirty="0" smtClean="0"/>
+          </a:p>
+          <a:p>
+            <a:r>
+              <a:rPr lang="en-US" dirty="0" smtClean="0"/>
+              <a:t>Roche </a:t>
+            </a:r>
+            <a:r>
+              <a:rPr lang="en-US" dirty="0"/>
+              <a:t>454 GS FLX, Junior</a:t>
+            </a:r>
+          </a:p>
+          <a:p>
+            <a:r>
+              <a:rPr lang="en-US" dirty="0" err="1"/>
+              <a:t>SOLiD</a:t>
+            </a:r>
+            <a:r>
+              <a:rPr lang="en-US" dirty="0"/>
+              <a:t> 1 2 3 4 5500 </a:t>
+            </a:r>
+            <a:r>
+              <a:rPr lang="en-US" dirty="0" smtClean="0"/>
+              <a:t>5500XL</a:t>
+            </a:r>
+          </a:p>
+          <a:p>
+            <a:r>
+              <a:rPr lang="en-US" dirty="0" smtClean="0"/>
+              <a:t>BGI </a:t>
+            </a:r>
+            <a:r>
+              <a:rPr lang="en-US" dirty="0" err="1"/>
+              <a:t>revolocity</a:t>
+            </a:r>
+            <a:endParaRPr lang="en-US" dirty="0"/>
+          </a:p>
+          <a:p>
+            <a:r>
+              <a:rPr lang="en-US" dirty="0" err="1"/>
+              <a:t>HeliScope</a:t>
+            </a:r>
+            <a:endParaRPr lang="en-US" dirty="0"/>
+          </a:p>
+          <a:p>
+            <a:r>
+              <a:rPr lang="en-US" dirty="0"/>
+              <a:t>ABI Sanger 3730xl</a:t>
+            </a:r>
+          </a:p>
+          <a:p>
+            <a:endParaRPr lang="en-US" u="sng" dirty="0" smtClean="0"/>
+          </a:p>
+          <a:p>
+            <a:r>
+              <a:rPr lang="en-US" u="sng" dirty="0" smtClean="0"/>
+              <a:t>Special </a:t>
+            </a:r>
+            <a:r>
+              <a:rPr lang="en-US" u="sng" dirty="0"/>
+              <a:t>types</a:t>
+            </a:r>
+          </a:p>
+          <a:p>
+            <a:r>
+              <a:rPr lang="en-US" dirty="0"/>
+              <a:t>10X genomics</a:t>
+            </a:r>
+          </a:p>
+          <a:p>
+            <a:r>
+              <a:rPr lang="en-US" dirty="0" err="1"/>
+              <a:t>Moleculo</a:t>
+            </a:r>
+            <a:r>
+              <a:rPr lang="en-US" dirty="0"/>
+              <a:t>/</a:t>
+            </a:r>
+            <a:r>
+              <a:rPr lang="en-US" dirty="0" err="1"/>
+              <a:t>TruSeq</a:t>
+            </a:r>
+            <a:r>
+              <a:rPr lang="en-US" dirty="0"/>
+              <a:t> synthetic </a:t>
+            </a:r>
+            <a:r>
+              <a:rPr lang="en-US" dirty="0" smtClean="0"/>
+              <a:t>reads</a:t>
+            </a:r>
+          </a:p>
+          <a:p>
+            <a:r>
+              <a:rPr lang="en-US" dirty="0" err="1" smtClean="0"/>
+              <a:t>BioNano</a:t>
+            </a:r>
+            <a:r>
+              <a:rPr lang="en-US" dirty="0" smtClean="0"/>
+              <a:t> </a:t>
+            </a:r>
+            <a:r>
+              <a:rPr lang="en-US" dirty="0"/>
+              <a:t>Genomics</a:t>
+            </a:r>
+          </a:p>
+        </p:txBody>
+      </p:sp>
+    </p:spTree>
+    <p:extLst>
+      <p:ext uri="{BB962C8B-B14F-4D97-AF65-F5344CB8AC3E}">
+        <p14:creationId xmlns:p14="http://schemas.microsoft.com/office/powerpoint/2010/main" val="3637483463"/>
+      </p:ext>
+    </p:extLst>
+  </p:cSld>
+  <p:clrMapOvr>
+    <a:masterClrMapping/>
+  </p:clrMapOvr>
+  <p:timing>
+    <p:tnLst>
+      <p:par>
+        <p:cTn xmlns:p14="http://schemas.microsoft.com/office/powerpoint/2010/main" id="1" dur="indefinite" restart="never" nodeType="tmRoot"/>
+      </p:par>
+    </p:tnLst>
+  </p:timing>
+</p:sld>
+</file>
+
+<file path=ppt/slides/slide3.xml><?xml version="1.0" encoding="utf-8"?>
+<p:sld xmlns:a="http://schemas.openxmlformats.org/drawingml/2006/main" xmlns:r="http://schemas.openxmlformats.org/officeDocument/2006/relationships" xmlns:p="http://schemas.openxmlformats.org/presentationml/2006/main">
+  <p:cSld>
+    <p:spTree>
+      <p:nvGrpSpPr>
+        <p:cNvPr id="1" name=""/>
+        <p:cNvGrpSpPr/>
+        <p:nvPr/>
+      </p:nvGrpSpPr>
+      <p:grpSpPr>
+        <a:xfrm>
+          <a:off x="0" y="0"/>
+          <a:ext cx="0" cy="0"/>
+          <a:chOff x="0" y="0"/>
+          <a:chExt cx="0" cy="0"/>
+        </a:xfrm>
+      </p:grpSpPr>
+      <p:sp>
+        <p:nvSpPr>
           <p:cNvPr id="2" name="Title 1"/>
           <p:cNvSpPr>
             <a:spLocks noGrp="1"/>
@@ -4564,10 +5101,17 @@
   <p:clrMapOvr>
     <a:masterClrMapping/>
   </p:clrMapOvr>
+  <p:timing>
+    <p:tnLst>
+      <p:par>
+        <p:cTn xmlns:p14="http://schemas.microsoft.com/office/powerpoint/2010/main" id="1" dur="indefinite" restart="never" nodeType="tmRoot"/>
+      </p:par>
+    </p:tnLst>
+  </p:timing>
 </p:sld>
 </file>
 
-<file path=ppt/slides/slide3.xml><?xml version="1.0" encoding="utf-8"?>
+<file path=ppt/slides/slide4.xml><?xml version="1.0" encoding="utf-8"?>
 <p:sld xmlns:a="http://schemas.openxmlformats.org/drawingml/2006/main" xmlns:r="http://schemas.openxmlformats.org/officeDocument/2006/relationships" xmlns:p="http://schemas.openxmlformats.org/presentationml/2006/main">
   <p:cSld>
     <p:spTree>
@@ -4688,10 +5232,17 @@
   <p:clrMapOvr>
     <a:masterClrMapping/>
   </p:clrMapOvr>
+  <p:timing>
+    <p:tnLst>
+      <p:par>
+        <p:cTn xmlns:p14="http://schemas.microsoft.com/office/powerpoint/2010/main" id="1" dur="indefinite" restart="never" nodeType="tmRoot"/>
+      </p:par>
+    </p:tnLst>
+  </p:timing>
 </p:sld>
 </file>
 
-<file path=ppt/slides/slide4.xml><?xml version="1.0" encoding="utf-8"?>
+<file path=ppt/slides/slide5.xml><?xml version="1.0" encoding="utf-8"?>
 <p:sld xmlns:a="http://schemas.openxmlformats.org/drawingml/2006/main" xmlns:r="http://schemas.openxmlformats.org/officeDocument/2006/relationships" xmlns:p="http://schemas.openxmlformats.org/presentationml/2006/main">
   <p:cSld>
     <p:spTree>
@@ -5027,7 +5578,7 @@
 </p:sld>
 </file>
 
-<file path=ppt/slides/slide5.xml><?xml version="1.0" encoding="utf-8"?>
+<file path=ppt/slides/slide6.xml><?xml version="1.0" encoding="utf-8"?>
 <p:sld xmlns:a="http://schemas.openxmlformats.org/drawingml/2006/main" xmlns:r="http://schemas.openxmlformats.org/officeDocument/2006/relationships" xmlns:p="http://schemas.openxmlformats.org/presentationml/2006/main">
   <p:cSld>
     <p:spTree>
@@ -5175,10 +5726,17 @@
   <p:clrMapOvr>
     <a:masterClrMapping/>
   </p:clrMapOvr>
+  <p:timing>
+    <p:tnLst>
+      <p:par>
+        <p:cTn xmlns:p14="http://schemas.microsoft.com/office/powerpoint/2010/main" id="1" dur="indefinite" restart="never" nodeType="tmRoot"/>
+      </p:par>
+    </p:tnLst>
+  </p:timing>
 </p:sld>
 </file>
 
-<file path=ppt/slides/slide6.xml><?xml version="1.0" encoding="utf-8"?>
+<file path=ppt/slides/slide7.xml><?xml version="1.0" encoding="utf-8"?>
 <p:sld xmlns:a="http://schemas.openxmlformats.org/drawingml/2006/main" xmlns:r="http://schemas.openxmlformats.org/officeDocument/2006/relationships" xmlns:p="http://schemas.openxmlformats.org/presentationml/2006/main">
   <p:cSld>
     <p:spTree>
@@ -6581,7 +7139,7 @@
 </p:sld>
 </file>
 
-<file path=ppt/slides/slide7.xml><?xml version="1.0" encoding="utf-8"?>
+<file path=ppt/slides/slide8.xml><?xml version="1.0" encoding="utf-8"?>
 <p:sld xmlns:a="http://schemas.openxmlformats.org/drawingml/2006/main" xmlns:r="http://schemas.openxmlformats.org/officeDocument/2006/relationships" xmlns:p="http://schemas.openxmlformats.org/presentationml/2006/main">
   <p:cSld>
     <p:spTree>
@@ -6687,174 +7245,6 @@
 </p:sld>
 </file>
 
-<file path=ppt/slides/slide8.xml><?xml version="1.0" encoding="utf-8"?>
-<p:sld xmlns:a="http://schemas.openxmlformats.org/drawingml/2006/main" xmlns:r="http://schemas.openxmlformats.org/officeDocument/2006/relationships" xmlns:p="http://schemas.openxmlformats.org/presentationml/2006/main">
-  <p:cSld>
-    <p:spTree>
-      <p:nvGrpSpPr>
-        <p:cNvPr id="1" name=""/>
-        <p:cNvGrpSpPr/>
-        <p:nvPr/>
-      </p:nvGrpSpPr>
-      <p:grpSpPr>
-        <a:xfrm>
-          <a:off x="0" y="0"/>
-          <a:ext cx="0" cy="0"/>
-          <a:chOff x="0" y="0"/>
-          <a:chExt cx="0" cy="0"/>
-        </a:xfrm>
-      </p:grpSpPr>
-      <p:sp>
-        <p:nvSpPr>
-          <p:cNvPr id="3" name="Title 2"/>
-          <p:cNvSpPr>
-            <a:spLocks noGrp="1"/>
-          </p:cNvSpPr>
-          <p:nvPr>
-            <p:ph type="title"/>
-          </p:nvPr>
-        </p:nvSpPr>
-        <p:spPr/>
-        <p:txBody>
-          <a:bodyPr/>
-          <a:lstStyle/>
-          <a:p>
-            <a:r>
-              <a:rPr lang="en-US" dirty="0"/>
-              <a:t>Data</a:t>
-            </a:r>
-          </a:p>
-        </p:txBody>
-      </p:sp>
-      <p:sp>
-        <p:nvSpPr>
-          <p:cNvPr id="2" name="Content Placeholder 1"/>
-          <p:cNvSpPr>
-            <a:spLocks noGrp="1"/>
-          </p:cNvSpPr>
-          <p:nvPr>
-            <p:ph idx="1"/>
-          </p:nvPr>
-        </p:nvSpPr>
-        <p:spPr/>
-        <p:txBody>
-          <a:bodyPr>
-            <a:normAutofit/>
-          </a:bodyPr>
-          <a:lstStyle/>
-          <a:p>
-            <a:pPr marL="457200" indent="-457200">
-              <a:buFont typeface="Arial"/>
-              <a:buChar char="•"/>
-            </a:pPr>
-            <a:r>
-              <a:rPr lang="en-US" dirty="0" smtClean="0"/>
-              <a:t>Amount </a:t>
-            </a:r>
-            <a:r>
-              <a:rPr lang="en-US" dirty="0"/>
-              <a:t>of </a:t>
-            </a:r>
-            <a:r>
-              <a:rPr lang="en-US" dirty="0" smtClean="0"/>
-              <a:t>data</a:t>
-            </a:r>
-          </a:p>
-          <a:p>
-            <a:pPr marL="457200" indent="-457200">
-              <a:buFont typeface="Arial"/>
-              <a:buChar char="•"/>
-            </a:pPr>
-            <a:r>
-              <a:rPr lang="en-US" dirty="0" smtClean="0"/>
-              <a:t>Finding data</a:t>
-            </a:r>
-          </a:p>
-          <a:p>
-            <a:pPr marL="457200" indent="-457200">
-              <a:buFont typeface="Arial"/>
-              <a:buChar char="•"/>
-            </a:pPr>
-            <a:r>
-              <a:rPr lang="en-US" dirty="0" smtClean="0"/>
-              <a:t>Getting </a:t>
-            </a:r>
-            <a:r>
-              <a:rPr lang="en-US" dirty="0"/>
-              <a:t>data in the right </a:t>
-            </a:r>
-            <a:r>
-              <a:rPr lang="en-US" dirty="0" smtClean="0"/>
-              <a:t>shape</a:t>
-            </a:r>
-          </a:p>
-          <a:p>
-            <a:pPr marL="457200" indent="-457200">
-              <a:buFont typeface="Arial"/>
-              <a:buChar char="•"/>
-            </a:pPr>
-            <a:r>
-              <a:rPr lang="en-US" dirty="0" smtClean="0"/>
-              <a:t>Scrubbing</a:t>
-            </a:r>
-          </a:p>
-          <a:p>
-            <a:pPr marL="457200" indent="-457200">
-              <a:buFont typeface="Arial"/>
-              <a:buChar char="•"/>
-            </a:pPr>
-            <a:r>
-              <a:rPr lang="en-US" dirty="0" smtClean="0"/>
-              <a:t>Understanding </a:t>
-            </a:r>
-            <a:r>
-              <a:rPr lang="en-US" dirty="0"/>
-              <a:t>the </a:t>
-            </a:r>
-            <a:r>
-              <a:rPr lang="en-US" dirty="0" smtClean="0"/>
-              <a:t>data</a:t>
-            </a:r>
-          </a:p>
-          <a:p>
-            <a:pPr marL="457200" indent="-457200">
-              <a:buFont typeface="Arial"/>
-              <a:buChar char="•"/>
-            </a:pPr>
-            <a:r>
-              <a:rPr lang="en-US" dirty="0" smtClean="0"/>
-              <a:t>Data management</a:t>
-            </a:r>
-          </a:p>
-          <a:p>
-            <a:pPr marL="457200" indent="-457200">
-              <a:buFont typeface="Arial"/>
-              <a:buChar char="•"/>
-            </a:pPr>
-            <a:r>
-              <a:rPr lang="en-US" dirty="0" smtClean="0"/>
-              <a:t>Sharing data</a:t>
-            </a:r>
-            <a:endParaRPr lang="en-US" dirty="0"/>
-          </a:p>
-          <a:p>
-            <a:endParaRPr lang="en-US" dirty="0"/>
-          </a:p>
-        </p:txBody>
-      </p:sp>
-    </p:spTree>
-    <p:extLst>
-      <p:ext uri="{BB962C8B-B14F-4D97-AF65-F5344CB8AC3E}">
-        <p14:creationId xmlns:p14="http://schemas.microsoft.com/office/powerpoint/2010/main" val="4158793306"/>
-      </p:ext>
-    </p:extLst>
-  </p:cSld>
-  <p:clrMapOvr>
-    <a:masterClrMapping/>
-  </p:clrMapOvr>
-</p:sld>
-</file>
-
 <file path=ppt/slides/slide9.xml><?xml version="1.0" encoding="utf-8"?>
 <p:sld xmlns:a="http://schemas.openxmlformats.org/drawingml/2006/main" xmlns:r="http://schemas.openxmlformats.org/officeDocument/2006/relationships" xmlns:p="http://schemas.openxmlformats.org/presentationml/2006/main">
   <p:cSld>
@@ -6888,10 +7278,9 @@
           <a:lstStyle/>
           <a:p>
             <a:r>
-              <a:rPr lang="en-US" dirty="0" smtClean="0"/>
-              <a:t>Software</a:t>
-            </a:r>
-            <a:endParaRPr lang="en-US" dirty="0"/>
+              <a:rPr lang="en-US" dirty="0"/>
+              <a:t>Data</a:t>
+            </a:r>
           </a:p>
         </p:txBody>
       </p:sp>
@@ -6918,15 +7307,15 @@
             </a:pPr>
             <a:r>
               <a:rPr lang="en-US" dirty="0" smtClean="0"/>
-              <a:t>Understanding </a:t>
+              <a:t>Amount </a:t>
             </a:r>
             <a:r>
               <a:rPr lang="en-US" dirty="0"/>
-              <a:t>the </a:t>
+              <a:t>of </a:t>
             </a:r>
             <a:r>
               <a:rPr lang="en-US" dirty="0" smtClean="0"/>
-              <a:t>algorithms</a:t>
+              <a:t>data</a:t>
             </a:r>
           </a:p>
           <a:p>
@@ -6936,7 +7325,7 @@
             </a:pPr>
             <a:r>
               <a:rPr lang="en-US" dirty="0" smtClean="0"/>
-              <a:t>Installing software</a:t>
+              <a:t>Finding data</a:t>
             </a:r>
           </a:p>
           <a:p>
@@ -6946,15 +7335,15 @@
             </a:pPr>
             <a:r>
               <a:rPr lang="en-US" dirty="0" smtClean="0"/>
-              <a:t>Choosing </a:t>
+              <a:t>Getting </a:t>
             </a:r>
             <a:r>
               <a:rPr lang="en-US" dirty="0"/>
-              <a:t>program from all </a:t>
+              <a:t>data in the right </a:t>
             </a:r>
             <a:r>
               <a:rPr lang="en-US" dirty="0" smtClean="0"/>
-              <a:t>possible</a:t>
+              <a:t>shape</a:t>
             </a:r>
           </a:p>
           <a:p>
@@ -6964,15 +7353,7 @@
             </a:pPr>
             <a:r>
               <a:rPr lang="en-US" dirty="0" smtClean="0"/>
-              <a:t>Can </a:t>
-            </a:r>
-            <a:r>
-              <a:rPr lang="en-US" dirty="0"/>
-              <a:t>not always use the same </a:t>
-            </a:r>
-            <a:r>
-              <a:rPr lang="en-US" dirty="0" smtClean="0"/>
-              <a:t>tool</a:t>
+              <a:t>Scrubbing</a:t>
             </a:r>
           </a:p>
           <a:p>
@@ -6982,15 +7363,15 @@
             </a:pPr>
             <a:r>
               <a:rPr lang="en-US" dirty="0" smtClean="0"/>
-              <a:t>Not </a:t>
+              <a:t>Understanding </a:t>
             </a:r>
             <a:r>
               <a:rPr lang="en-US" dirty="0"/>
-              <a:t>always the same tool that is </a:t>
+              <a:t>the </a:t>
             </a:r>
             <a:r>
               <a:rPr lang="en-US" dirty="0" smtClean="0"/>
-              <a:t>best</a:t>
+              <a:t>data</a:t>
             </a:r>
           </a:p>
           <a:p>
@@ -7000,15 +7381,7 @@
             </a:pPr>
             <a:r>
               <a:rPr lang="en-US" dirty="0" smtClean="0"/>
-              <a:t>Software </a:t>
-            </a:r>
-            <a:r>
-              <a:rPr lang="en-US" dirty="0"/>
-              <a:t>parameter </a:t>
-            </a:r>
-            <a:r>
-              <a:rPr lang="en-US" dirty="0" smtClean="0"/>
-              <a:t>space</a:t>
+              <a:t>Data management</a:t>
             </a:r>
           </a:p>
           <a:p>
@@ -7018,14 +7391,8 @@
             </a:pPr>
             <a:r>
               <a:rPr lang="en-US" dirty="0" smtClean="0"/>
-              <a:t>Validation of </a:t>
-            </a:r>
-            <a:r>
-              <a:rPr lang="en-US" dirty="0"/>
-              <a:t>computational results</a:t>
-            </a:r>
-          </a:p>
-          <a:p>
+              <a:t>Sharing data</a:t>
+            </a:r>
             <a:endParaRPr lang="en-US" dirty="0"/>
           </a:p>
           <a:p>
@@ -7036,13 +7403,20 @@
     </p:spTree>
     <p:extLst>
       <p:ext uri="{BB962C8B-B14F-4D97-AF65-F5344CB8AC3E}">
-        <p14:creationId xmlns:p14="http://schemas.microsoft.com/office/powerpoint/2010/main" val="4113967667"/>
+        <p14:creationId xmlns:p14="http://schemas.microsoft.com/office/powerpoint/2010/main" val="4158793306"/>
       </p:ext>
     </p:extLst>
   </p:cSld>
   <p:clrMapOvr>
     <a:masterClrMapping/>
   </p:clrMapOvr>
+  <p:timing>
+    <p:tnLst>
+      <p:par>
+        <p:cTn xmlns:p14="http://schemas.microsoft.com/office/powerpoint/2010/main" id="1" dur="indefinite" restart="never" nodeType="tmRoot"/>
+      </p:par>
+    </p:tnLst>
+  </p:timing>
 </p:sld>
 </file>
 

</xml_diff>